<commit_message>
Avance 01.12.2023 - 21:49pm
</commit_message>
<xml_diff>
--- a/Python Crash Course Legacy 2023.pptx
+++ b/Python Crash Course Legacy 2023.pptx
@@ -104,6 +104,11 @@
       </a:defRPr>
     </a:lvl9pPr>
   </p:defaultTextStyle>
+  <p:extLst>
+    <p:ext uri="{EFAFB233-063F-42B5-8137-9DF3F51BA10A}">
+      <p15:sldGuideLst xmlns:p15="http://schemas.microsoft.com/office/powerpoint/2012/main"/>
+    </p:ext>
+  </p:extLst>
 </p:presentation>
 </file>
 
@@ -2992,7 +2997,7 @@
         </p:nvSpPr>
         <p:spPr>
           <a:xfrm>
-            <a:off x="317365" y="346759"/>
+            <a:off x="317365" y="107005"/>
             <a:ext cx="8509270" cy="793203"/>
           </a:xfrm>
         </p:spPr>
@@ -3073,7 +3078,7 @@
         </p:nvSpPr>
         <p:spPr>
           <a:xfrm>
-            <a:off x="3084786" y="1297215"/>
+            <a:off x="3084786" y="930934"/>
             <a:ext cx="2974428" cy="391340"/>
           </a:xfrm>
         </p:spPr>
@@ -3110,7 +3115,7 @@
         </p:nvSpPr>
         <p:spPr>
           <a:xfrm>
-            <a:off x="510702" y="1879082"/>
+            <a:off x="150779" y="1322274"/>
             <a:ext cx="8122596" cy="2308324"/>
           </a:xfrm>
           <a:prstGeom prst="rect">
@@ -3297,7 +3302,7 @@
         </p:nvSpPr>
         <p:spPr>
           <a:xfrm>
-            <a:off x="510702" y="4463606"/>
+            <a:off x="150779" y="3825201"/>
             <a:ext cx="8122596" cy="2031325"/>
           </a:xfrm>
           <a:prstGeom prst="rect">
@@ -3463,8 +3468,8 @@
         </p:blipFill>
         <p:spPr>
           <a:xfrm>
-            <a:off x="6308985" y="2826322"/>
-            <a:ext cx="2582095" cy="2104684"/>
+            <a:off x="6098172" y="2240113"/>
+            <a:ext cx="2511870" cy="2047443"/>
           </a:xfrm>
           <a:prstGeom prst="rect">
             <a:avLst/>
@@ -3500,8 +3505,8 @@
         </p:blipFill>
         <p:spPr bwMode="auto">
           <a:xfrm>
-            <a:off x="6923053" y="1147413"/>
-            <a:ext cx="1520556" cy="1520556"/>
+            <a:off x="6844924" y="878384"/>
+            <a:ext cx="1235416" cy="1235416"/>
           </a:xfrm>
           <a:prstGeom prst="rect">
             <a:avLst/>
@@ -3518,6 +3523,81 @@
           </a:extLst>
         </p:spPr>
       </p:pic>
+      <p:sp>
+        <p:nvSpPr>
+          <p:cNvPr id="6" name="TextBox 5">
+            <a:extLst>
+              <a:ext uri="{FF2B5EF4-FFF2-40B4-BE49-F238E27FC236}">
+                <a16:creationId xmlns:a16="http://schemas.microsoft.com/office/drawing/2014/main" id="{096BEBFD-651A-AA6B-0438-0A714108BF22}"/>
+              </a:ext>
+            </a:extLst>
+          </p:cNvPr>
+          <p:cNvSpPr txBox="1"/>
+          <p:nvPr/>
+        </p:nvSpPr>
+        <p:spPr>
+          <a:xfrm>
+            <a:off x="150779" y="5917813"/>
+            <a:ext cx="8842442" cy="784830"/>
+          </a:xfrm>
+          <a:prstGeom prst="rect">
+            <a:avLst/>
+          </a:prstGeom>
+          <a:noFill/>
+        </p:spPr>
+        <p:txBody>
+          <a:bodyPr wrap="square" rtlCol="0">
+            <a:spAutoFit/>
+          </a:bodyPr>
+          <a:lstStyle/>
+          <a:p>
+            <a:r>
+              <a:rPr lang="es-419" sz="2000" dirty="0">
+                <a:solidFill>
+                  <a:srgbClr val="FF99FF"/>
+                </a:solidFill>
+              </a:rPr>
+              <a:t>IMPORTANTE: Repositorio GitHub del Curso:</a:t>
+            </a:r>
+          </a:p>
+          <a:p>
+            <a:endParaRPr lang="es-419" sz="500" dirty="0">
+              <a:solidFill>
+                <a:srgbClr val="FF99FF"/>
+              </a:solidFill>
+            </a:endParaRPr>
+          </a:p>
+          <a:p>
+            <a:pPr algn="r"/>
+            <a:r>
+              <a:rPr lang="es-419" sz="2000" dirty="0">
+                <a:solidFill>
+                  <a:srgbClr val="FFFF00"/>
+                </a:solidFill>
+                <a:highlight>
+                  <a:srgbClr val="0000FF"/>
+                </a:highlight>
+                <a:hlinkClick r:id="rId5">
+                  <a:extLst>
+                    <a:ext uri="{A12FA001-AC4F-418D-AE19-62706E023703}">
+                      <ahyp:hlinkClr xmlns:ahyp="http://schemas.microsoft.com/office/drawing/2018/hyperlinkcolor" val="tx"/>
+                    </a:ext>
+                  </a:extLst>
+                </a:hlinkClick>
+              </a:rPr>
+              <a:t>https://github.com/sebassilvap/CrashCoursePython-2023</a:t>
+            </a:r>
+            <a:endParaRPr lang="es-419" sz="2000" dirty="0">
+              <a:solidFill>
+                <a:srgbClr val="FFFF00"/>
+              </a:solidFill>
+              <a:highlight>
+                <a:srgbClr val="0000FF"/>
+              </a:highlight>
+            </a:endParaRPr>
+          </a:p>
+        </p:txBody>
+      </p:sp>
     </p:spTree>
     <p:extLst>
       <p:ext uri="{BB962C8B-B14F-4D97-AF65-F5344CB8AC3E}">

</xml_diff>

<commit_message>
Avance 08.12.2023 - 14:13pm
</commit_message>
<xml_diff>
--- a/Python Crash Course Legacy 2023.pptx
+++ b/Python Crash Course Legacy 2023.pptx
@@ -243,7 +243,7 @@
           <a:p>
             <a:fld id="{F1952DC9-6DA2-4784-8E31-E76B81528EFA}" type="datetimeFigureOut">
               <a:rPr lang="es-419" smtClean="0"/>
-              <a:t>1/12/2023</a:t>
+              <a:t>8/12/2023</a:t>
             </a:fld>
             <a:endParaRPr lang="es-419"/>
           </a:p>
@@ -413,7 +413,7 @@
           <a:p>
             <a:fld id="{F1952DC9-6DA2-4784-8E31-E76B81528EFA}" type="datetimeFigureOut">
               <a:rPr lang="es-419" smtClean="0"/>
-              <a:t>1/12/2023</a:t>
+              <a:t>8/12/2023</a:t>
             </a:fld>
             <a:endParaRPr lang="es-419"/>
           </a:p>
@@ -593,7 +593,7 @@
           <a:p>
             <a:fld id="{F1952DC9-6DA2-4784-8E31-E76B81528EFA}" type="datetimeFigureOut">
               <a:rPr lang="es-419" smtClean="0"/>
-              <a:t>1/12/2023</a:t>
+              <a:t>8/12/2023</a:t>
             </a:fld>
             <a:endParaRPr lang="es-419"/>
           </a:p>
@@ -763,7 +763,7 @@
           <a:p>
             <a:fld id="{F1952DC9-6DA2-4784-8E31-E76B81528EFA}" type="datetimeFigureOut">
               <a:rPr lang="es-419" smtClean="0"/>
-              <a:t>1/12/2023</a:t>
+              <a:t>8/12/2023</a:t>
             </a:fld>
             <a:endParaRPr lang="es-419"/>
           </a:p>
@@ -1007,7 +1007,7 @@
           <a:p>
             <a:fld id="{F1952DC9-6DA2-4784-8E31-E76B81528EFA}" type="datetimeFigureOut">
               <a:rPr lang="es-419" smtClean="0"/>
-              <a:t>1/12/2023</a:t>
+              <a:t>8/12/2023</a:t>
             </a:fld>
             <a:endParaRPr lang="es-419"/>
           </a:p>
@@ -1239,7 +1239,7 @@
           <a:p>
             <a:fld id="{F1952DC9-6DA2-4784-8E31-E76B81528EFA}" type="datetimeFigureOut">
               <a:rPr lang="es-419" smtClean="0"/>
-              <a:t>1/12/2023</a:t>
+              <a:t>8/12/2023</a:t>
             </a:fld>
             <a:endParaRPr lang="es-419"/>
           </a:p>
@@ -1606,7 +1606,7 @@
           <a:p>
             <a:fld id="{F1952DC9-6DA2-4784-8E31-E76B81528EFA}" type="datetimeFigureOut">
               <a:rPr lang="es-419" smtClean="0"/>
-              <a:t>1/12/2023</a:t>
+              <a:t>8/12/2023</a:t>
             </a:fld>
             <a:endParaRPr lang="es-419"/>
           </a:p>
@@ -1724,7 +1724,7 @@
           <a:p>
             <a:fld id="{F1952DC9-6DA2-4784-8E31-E76B81528EFA}" type="datetimeFigureOut">
               <a:rPr lang="es-419" smtClean="0"/>
-              <a:t>1/12/2023</a:t>
+              <a:t>8/12/2023</a:t>
             </a:fld>
             <a:endParaRPr lang="es-419"/>
           </a:p>
@@ -1819,7 +1819,7 @@
           <a:p>
             <a:fld id="{F1952DC9-6DA2-4784-8E31-E76B81528EFA}" type="datetimeFigureOut">
               <a:rPr lang="es-419" smtClean="0"/>
-              <a:t>1/12/2023</a:t>
+              <a:t>8/12/2023</a:t>
             </a:fld>
             <a:endParaRPr lang="es-419"/>
           </a:p>
@@ -2096,7 +2096,7 @@
           <a:p>
             <a:fld id="{F1952DC9-6DA2-4784-8E31-E76B81528EFA}" type="datetimeFigureOut">
               <a:rPr lang="es-419" smtClean="0"/>
-              <a:t>1/12/2023</a:t>
+              <a:t>8/12/2023</a:t>
             </a:fld>
             <a:endParaRPr lang="es-419"/>
           </a:p>
@@ -2353,7 +2353,7 @@
           <a:p>
             <a:fld id="{F1952DC9-6DA2-4784-8E31-E76B81528EFA}" type="datetimeFigureOut">
               <a:rPr lang="es-419" smtClean="0"/>
-              <a:t>1/12/2023</a:t>
+              <a:t>8/12/2023</a:t>
             </a:fld>
             <a:endParaRPr lang="es-419"/>
           </a:p>
@@ -2566,7 +2566,7 @@
           <a:p>
             <a:fld id="{F1952DC9-6DA2-4784-8E31-E76B81528EFA}" type="datetimeFigureOut">
               <a:rPr lang="es-419" smtClean="0"/>
-              <a:t>1/12/2023</a:t>
+              <a:t>8/12/2023</a:t>
             </a:fld>
             <a:endParaRPr lang="es-419"/>
           </a:p>
@@ -3139,7 +3139,7 @@
                   <a:schemeClr val="bg1"/>
                 </a:solidFill>
               </a:rPr>
-              <a:t>Más de 60 temas / conceptos importantes de Python.</a:t>
+              <a:t>+ 60 temas / conceptos importantes de Python / 15 horas</a:t>
             </a:r>
           </a:p>
           <a:p>
@@ -3283,7 +3283,7 @@
                   <a:schemeClr val="bg1"/>
                 </a:solidFill>
               </a:rPr>
-              <a:t>No se cubren temas como: POO, Módulos, Ficheros</a:t>
+              <a:t>No se cubren temas como: POO, Módulos, Ficheros, Tkinter</a:t>
             </a:r>
           </a:p>
         </p:txBody>
@@ -3302,7 +3302,7 @@
         </p:nvSpPr>
         <p:spPr>
           <a:xfrm>
-            <a:off x="150779" y="3825201"/>
+            <a:off x="150779" y="3722735"/>
             <a:ext cx="8122596" cy="2031325"/>
           </a:xfrm>
           <a:prstGeom prst="rect">
@@ -3372,25 +3372,7 @@
                 </a:solidFill>
                 <a:sym typeface="Wingdings" panose="05000000000000000000" pitchFamily="2" charset="2"/>
               </a:rPr>
-              <a:t>: tarea del colegio, algún algoritmo para mejorar tu trabajo, sorprender a tu jefe, </a:t>
-            </a:r>
-            <a:r>
-              <a:rPr lang="es-419" dirty="0" err="1">
-                <a:solidFill>
-                  <a:schemeClr val="bg1"/>
-                </a:solidFill>
-                <a:sym typeface="Wingdings" panose="05000000000000000000" pitchFamily="2" charset="2"/>
-              </a:rPr>
-              <a:t>etc</a:t>
-            </a:r>
-            <a:r>
-              <a:rPr lang="es-419" dirty="0">
-                <a:solidFill>
-                  <a:schemeClr val="bg1"/>
-                </a:solidFill>
-                <a:sym typeface="Wingdings" panose="05000000000000000000" pitchFamily="2" charset="2"/>
-              </a:rPr>
-              <a:t>…</a:t>
+              <a:t>: tarea del colegio, algún algoritmo para mejorar tu trabajo, sorprender a tu jefe, no hay Excel en el computador?, entonces Python!</a:t>
             </a:r>
           </a:p>
           <a:p>
@@ -3468,7 +3450,7 @@
         </p:blipFill>
         <p:spPr>
           <a:xfrm>
-            <a:off x="6098172" y="2240113"/>
+            <a:off x="6314765" y="2085880"/>
             <a:ext cx="2511870" cy="2047443"/>
           </a:xfrm>
           <a:prstGeom prst="rect">
@@ -3505,8 +3487,8 @@
         </p:blipFill>
         <p:spPr bwMode="auto">
           <a:xfrm>
-            <a:off x="6844924" y="878384"/>
-            <a:ext cx="1235416" cy="1235416"/>
+            <a:off x="7160008" y="845131"/>
+            <a:ext cx="1025818" cy="1025818"/>
           </a:xfrm>
           <a:prstGeom prst="rect">
             <a:avLst/>
@@ -3537,8 +3519,8 @@
         </p:nvSpPr>
         <p:spPr>
           <a:xfrm>
-            <a:off x="150779" y="5917813"/>
-            <a:ext cx="8842442" cy="784830"/>
+            <a:off x="150779" y="5839992"/>
+            <a:ext cx="8842442" cy="846386"/>
           </a:xfrm>
           <a:prstGeom prst="rect">
             <a:avLst/>
@@ -3570,12 +3552,12 @@
           <a:p>
             <a:pPr algn="r"/>
             <a:r>
-              <a:rPr lang="es-419" sz="2000" dirty="0">
+              <a:rPr lang="es-419" sz="2400" dirty="0">
                 <a:solidFill>
                   <a:srgbClr val="FFFF00"/>
                 </a:solidFill>
                 <a:highlight>
-                  <a:srgbClr val="0000FF"/>
+                  <a:srgbClr val="000080"/>
                 </a:highlight>
                 <a:hlinkClick r:id="rId5">
                   <a:extLst>
@@ -3587,12 +3569,12 @@
               </a:rPr>
               <a:t>https://github.com/sebassilvap/CrashCoursePython-2023</a:t>
             </a:r>
-            <a:endParaRPr lang="es-419" sz="2000" dirty="0">
+            <a:endParaRPr lang="es-419" sz="2400" dirty="0">
               <a:solidFill>
                 <a:srgbClr val="FFFF00"/>
               </a:solidFill>
               <a:highlight>
-                <a:srgbClr val="0000FF"/>
+                <a:srgbClr val="000080"/>
               </a:highlight>
             </a:endParaRPr>
           </a:p>

</xml_diff>